<commit_message>
new user guide added
</commit_message>
<xml_diff>
--- a/intel_ocr/docs/intel_internal_review_10thNov.pptx
+++ b/intel_ocr/docs/intel_internal_review_10thNov.pptx
@@ -239,7 +239,7 @@
           <a:p>
             <a:fld id="{6007911F-CEAF-4F0B-98BD-EFB38C6572AA}" type="datetimeFigureOut">
               <a:rPr lang="de-DE" smtClean="0"/>
-              <a:t>10.11.2019</a:t>
+              <a:t>12.11.2019</a:t>
             </a:fld>
             <a:endParaRPr lang="de-DE"/>
           </a:p>
@@ -9793,11 +9793,7 @@
           <a:p>
             <a:r>
               <a:rPr lang="de-DE" dirty="0" smtClean="0"/>
-              <a:t>Intel </a:t>
-            </a:r>
-            <a:r>
-              <a:rPr lang="de-DE" dirty="0" smtClean="0"/>
-              <a:t>– ocr</a:t>
+              <a:t>Intel – ocr</a:t>
             </a:r>
             <a:endParaRPr lang="de-DE" dirty="0"/>
           </a:p>
@@ -10173,15 +10169,7 @@
             </a:r>
             <a:r>
               <a:rPr lang="en-US" dirty="0" smtClean="0"/>
-              <a:t>. Inputs from </a:t>
-            </a:r>
-            <a:r>
-              <a:rPr lang="en-US" dirty="0" smtClean="0"/>
-              <a:t>Intel </a:t>
-            </a:r>
-            <a:r>
-              <a:rPr lang="en-US" dirty="0" smtClean="0"/>
-              <a:t>[ For tuning Parameters ]</a:t>
+              <a:t>. Inputs from Intel [ For tuning Parameters ]</a:t>
             </a:r>
           </a:p>
           <a:p>
@@ -11600,11 +11588,7 @@
                       </a:pPr>
                       <a:r>
                         <a:rPr lang="en-US" sz="1400" dirty="0" smtClean="0"/>
-                        <a:t>Sample </a:t>
-                      </a:r>
-                      <a:r>
-                        <a:rPr lang="en-US" sz="1400" dirty="0" smtClean="0"/>
-                        <a:t>application in which take image input and provide image output with colored bounding boxes with Right or Wrong indication. Application should also generate detailed log file. </a:t>
+                        <a:t>Sample application in which take image input and provide image output with colored bounding boxes with Right or Wrong indication. Application should also generate detailed log file. </a:t>
                       </a:r>
                       <a:br>
                         <a:rPr lang="en-US" sz="1400" dirty="0" smtClean="0"/>
@@ -11625,10 +11609,6 @@
                       <a:r>
                         <a:rPr lang="en-US" sz="1400" dirty="0" smtClean="0"/>
                         <a:t> </a:t>
-                      </a:r>
-                      <a:r>
-                        <a:rPr lang="en-US" sz="1400" dirty="0" smtClean="0"/>
-                        <a:t/>
                       </a:r>
                       <a:br>
                         <a:rPr lang="en-US" sz="1400" dirty="0" smtClean="0"/>
@@ -11723,45 +11703,8 @@
                             <a:srgbClr val="000000"/>
                           </a:solidFill>
                         </a:rPr>
-                        <a:t>Currently </a:t>
+                        <a:t>Currently Sample application takes images as a input and provides images a output with right, wrong and undetermined colored bounding boxes. Image output is being saved in ‘logs’ folder with respective image name and timestamp. Prediction logs are present in server</a:t>
                       </a:r>
-                      <a:r>
-                        <a:rPr lang="en-US" sz="1400" kern="0" dirty="0" smtClean="0">
-                          <a:solidFill>
-                            <a:srgbClr val="000000"/>
-                          </a:solidFill>
-                        </a:rPr>
-                        <a:t>Sample application takes images as a input and provides images a output with right, wrong and undetermined </a:t>
-                      </a:r>
-                      <a:r>
-                        <a:rPr lang="en-US" sz="1400" kern="0" dirty="0" smtClean="0">
-                          <a:solidFill>
-                            <a:srgbClr val="000000"/>
-                          </a:solidFill>
-                        </a:rPr>
-                        <a:t>colored bounding boxes. </a:t>
-                      </a:r>
-                      <a:r>
-                        <a:rPr lang="en-US" sz="1400" kern="0" dirty="0" smtClean="0">
-                          <a:solidFill>
-                            <a:srgbClr val="000000"/>
-                          </a:solidFill>
-                        </a:rPr>
-                        <a:t>Image output is being saved in ‘logs’ folder with respective image name and timestamp</a:t>
-                      </a:r>
-                      <a:r>
-                        <a:rPr lang="en-US" sz="1400" kern="0" dirty="0" smtClean="0">
-                          <a:solidFill>
-                            <a:srgbClr val="000000"/>
-                          </a:solidFill>
-                        </a:rPr>
-                        <a:t>. Prediction logs are present in server</a:t>
-                      </a:r>
-                      <a:endParaRPr lang="en-US" sz="1400" kern="0" dirty="0" smtClean="0">
-                        <a:solidFill>
-                          <a:srgbClr val="000000"/>
-                        </a:solidFill>
-                      </a:endParaRPr>
                     </a:p>
                     <a:p>
                       <a:pPr marL="342900" indent="-342900">
@@ -12796,7 +12739,23 @@
                   <a:srgbClr val="000000"/>
                 </a:solidFill>
               </a:rPr>
-              <a:t>raud detection by student’</a:t>
+              <a:t>raud detection </a:t>
+            </a:r>
+            <a:r>
+              <a:rPr lang="en-US" i="1" kern="0" dirty="0" smtClean="0">
+                <a:solidFill>
+                  <a:srgbClr val="000000"/>
+                </a:solidFill>
+              </a:rPr>
+              <a:t>of</a:t>
+            </a:r>
+            <a:r>
+              <a:rPr lang="en-US" i="1" kern="0" baseline="0" dirty="0" smtClean="0">
+                <a:solidFill>
+                  <a:srgbClr val="000000"/>
+                </a:solidFill>
+              </a:rPr>
+              <a:t> students’</a:t>
             </a:r>
             <a:r>
               <a:rPr lang="en-US" kern="0" baseline="0" dirty="0" smtClean="0">
@@ -12804,7 +12763,15 @@
                   <a:srgbClr val="000000"/>
                 </a:solidFill>
               </a:rPr>
-              <a:t> , </a:t>
+              <a:t> </a:t>
+            </a:r>
+            <a:r>
+              <a:rPr lang="en-US" kern="0" baseline="0" dirty="0" smtClean="0">
+                <a:solidFill>
+                  <a:srgbClr val="000000"/>
+                </a:solidFill>
+              </a:rPr>
+              <a:t>, </a:t>
             </a:r>
             <a:r>
               <a:rPr lang="en-US" i="1" kern="0" dirty="0" smtClean="0">
@@ -12881,29 +12848,8 @@
                   <a:srgbClr val="000000"/>
                 </a:solidFill>
               </a:rPr>
-              <a:t>.  Recognition </a:t>
-            </a:r>
-            <a:r>
-              <a:rPr lang="en-US" kern="0" dirty="0" smtClean="0">
-                <a:solidFill>
-                  <a:srgbClr val="000000"/>
-                </a:solidFill>
-              </a:rPr>
-              <a:t>of cursive kind of handwritings where character are not at all </a:t>
-            </a:r>
-            <a:r>
-              <a:rPr lang="en-US" kern="0" dirty="0" smtClean="0">
-                <a:solidFill>
-                  <a:srgbClr val="000000"/>
-                </a:solidFill>
-              </a:rPr>
-              <a:t>separated</a:t>
-            </a:r>
-            <a:endParaRPr lang="en-US" kern="0" dirty="0" smtClean="0">
-              <a:solidFill>
-                <a:srgbClr val="000000"/>
-              </a:solidFill>
-            </a:endParaRPr>
+              <a:t>.  Recognition of cursive kind of handwritings where character are not at all separated</a:t>
+            </a:r>
           </a:p>
         </p:txBody>
       </p:sp>

</xml_diff>